<commit_message>
Updated the final presentation with Use cases
</commit_message>
<xml_diff>
--- a/Ticket-Agency-Final.pptx
+++ b/Ticket-Agency-Final.pptx
@@ -15,9 +15,15 @@
     <p:sldId id="275" r:id="rId9"/>
     <p:sldId id="269" r:id="rId10"/>
     <p:sldId id="271" r:id="rId11"/>
-    <p:sldId id="276" r:id="rId12"/>
-    <p:sldId id="277" r:id="rId13"/>
-    <p:sldId id="274" r:id="rId14"/>
+    <p:sldId id="278" r:id="rId12"/>
+    <p:sldId id="279" r:id="rId13"/>
+    <p:sldId id="280" r:id="rId14"/>
+    <p:sldId id="281" r:id="rId15"/>
+    <p:sldId id="282" r:id="rId16"/>
+    <p:sldId id="283" r:id="rId17"/>
+    <p:sldId id="276" r:id="rId18"/>
+    <p:sldId id="277" r:id="rId19"/>
+    <p:sldId id="274" r:id="rId20"/>
   </p:sldIdLst>
   <p:sldSz cx="12192000" cy="6858000"/>
   <p:notesSz cx="6858000" cy="9144000"/>
@@ -849,7 +855,7 @@
             <a:fld id="{B61BEF0D-F0BB-DE4B-95CE-6DB70DBA9567}" type="datetimeFigureOut">
               <a:rPr lang="en-US" dirty="0"/>
               <a:pPr/>
-              <a:t>4/19/16</a:t>
+              <a:t>4/30/16</a:t>
             </a:fld>
             <a:endParaRPr lang="en-US" dirty="0"/>
           </a:p>
@@ -1097,7 +1103,7 @@
             <a:fld id="{B61BEF0D-F0BB-DE4B-95CE-6DB70DBA9567}" type="datetimeFigureOut">
               <a:rPr lang="en-US" dirty="0"/>
               <a:pPr/>
-              <a:t>4/19/16</a:t>
+              <a:t>4/30/16</a:t>
             </a:fld>
             <a:endParaRPr lang="en-US" dirty="0"/>
           </a:p>
@@ -1408,7 +1414,7 @@
             <a:fld id="{B61BEF0D-F0BB-DE4B-95CE-6DB70DBA9567}" type="datetimeFigureOut">
               <a:rPr lang="en-US" dirty="0"/>
               <a:pPr/>
-              <a:t>4/19/16</a:t>
+              <a:t>4/30/16</a:t>
             </a:fld>
             <a:endParaRPr lang="en-US" dirty="0"/>
           </a:p>
@@ -1732,7 +1738,7 @@
             <a:fld id="{B61BEF0D-F0BB-DE4B-95CE-6DB70DBA9567}" type="datetimeFigureOut">
               <a:rPr lang="en-US" dirty="0"/>
               <a:pPr/>
-              <a:t>4/19/16</a:t>
+              <a:t>4/30/16</a:t>
             </a:fld>
             <a:endParaRPr lang="en-US" dirty="0"/>
           </a:p>
@@ -2043,7 +2049,7 @@
             <a:fld id="{B61BEF0D-F0BB-DE4B-95CE-6DB70DBA9567}" type="datetimeFigureOut">
               <a:rPr lang="en-US" dirty="0"/>
               <a:pPr/>
-              <a:t>4/19/16</a:t>
+              <a:t>4/30/16</a:t>
             </a:fld>
             <a:endParaRPr lang="en-US" dirty="0"/>
           </a:p>
@@ -2427,7 +2433,7 @@
             <a:fld id="{B61BEF0D-F0BB-DE4B-95CE-6DB70DBA9567}" type="datetimeFigureOut">
               <a:rPr lang="en-US" dirty="0"/>
               <a:pPr/>
-              <a:t>4/19/16</a:t>
+              <a:t>4/30/16</a:t>
             </a:fld>
             <a:endParaRPr lang="en-US" dirty="0"/>
           </a:p>
@@ -2593,7 +2599,7 @@
           <a:p>
             <a:fld id="{55C6B4A9-1611-4792-9094-5F34BCA07E0B}" type="datetimeFigureOut">
               <a:rPr lang="en-US" dirty="0"/>
-              <a:t>4/19/16</a:t>
+              <a:t>4/30/16</a:t>
             </a:fld>
             <a:endParaRPr lang="en-US" dirty="0"/>
           </a:p>
@@ -2769,7 +2775,7 @@
             <a:fld id="{B61BEF0D-F0BB-DE4B-95CE-6DB70DBA9567}" type="datetimeFigureOut">
               <a:rPr lang="en-US" dirty="0"/>
               <a:pPr/>
-              <a:t>4/19/16</a:t>
+              <a:t>4/30/16</a:t>
             </a:fld>
             <a:endParaRPr lang="en-US" dirty="0"/>
           </a:p>
@@ -2942,7 +2948,7 @@
             <a:fld id="{B61BEF0D-F0BB-DE4B-95CE-6DB70DBA9567}" type="datetimeFigureOut">
               <a:rPr lang="en-US" dirty="0"/>
               <a:pPr/>
-              <a:t>4/19/16</a:t>
+              <a:t>4/30/16</a:t>
             </a:fld>
             <a:endParaRPr lang="en-US" dirty="0"/>
           </a:p>
@@ -3186,7 +3192,7 @@
             <a:fld id="{B61BEF0D-F0BB-DE4B-95CE-6DB70DBA9567}" type="datetimeFigureOut">
               <a:rPr lang="en-US" dirty="0"/>
               <a:pPr/>
-              <a:t>4/19/16</a:t>
+              <a:t>4/30/16</a:t>
             </a:fld>
             <a:endParaRPr lang="en-US" dirty="0"/>
           </a:p>
@@ -3414,7 +3420,7 @@
           <a:p>
             <a:fld id="{EB712588-04B1-427B-82EE-E8DB90309F08}" type="datetimeFigureOut">
               <a:rPr lang="en-US" dirty="0"/>
-              <a:t>4/19/16</a:t>
+              <a:t>4/30/16</a:t>
             </a:fld>
             <a:endParaRPr lang="en-US" dirty="0"/>
           </a:p>
@@ -3784,7 +3790,7 @@
             <a:fld id="{B61BEF0D-F0BB-DE4B-95CE-6DB70DBA9567}" type="datetimeFigureOut">
               <a:rPr lang="en-US" dirty="0"/>
               <a:pPr/>
-              <a:t>4/19/16</a:t>
+              <a:t>4/30/16</a:t>
             </a:fld>
             <a:endParaRPr lang="en-US" dirty="0"/>
           </a:p>
@@ -3904,7 +3910,7 @@
             <a:fld id="{B61BEF0D-F0BB-DE4B-95CE-6DB70DBA9567}" type="datetimeFigureOut">
               <a:rPr lang="en-US" dirty="0"/>
               <a:pPr/>
-              <a:t>4/19/16</a:t>
+              <a:t>4/30/16</a:t>
             </a:fld>
             <a:endParaRPr lang="en-US" dirty="0"/>
           </a:p>
@@ -3996,7 +4002,7 @@
             <a:fld id="{B61BEF0D-F0BB-DE4B-95CE-6DB70DBA9567}" type="datetimeFigureOut">
               <a:rPr lang="en-US" dirty="0"/>
               <a:pPr/>
-              <a:t>4/19/16</a:t>
+              <a:t>4/30/16</a:t>
             </a:fld>
             <a:endParaRPr lang="en-US" dirty="0"/>
           </a:p>
@@ -4247,7 +4253,7 @@
           <a:p>
             <a:fld id="{42A54C80-263E-416B-A8E0-580EDEADCBDC}" type="datetimeFigureOut">
               <a:rPr lang="en-US" dirty="0"/>
-              <a:t>4/19/16</a:t>
+              <a:t>4/30/16</a:t>
             </a:fld>
             <a:endParaRPr lang="en-US" dirty="0"/>
           </a:p>
@@ -4506,7 +4512,7 @@
             <a:fld id="{B61BEF0D-F0BB-DE4B-95CE-6DB70DBA9567}" type="datetimeFigureOut">
               <a:rPr lang="en-US" dirty="0"/>
               <a:pPr/>
-              <a:t>4/19/16</a:t>
+              <a:t>4/30/16</a:t>
             </a:fld>
             <a:endParaRPr lang="en-US" dirty="0"/>
           </a:p>
@@ -5248,7 +5254,7 @@
             <a:fld id="{B61BEF0D-F0BB-DE4B-95CE-6DB70DBA9567}" type="datetimeFigureOut">
               <a:rPr lang="en-US" dirty="0"/>
               <a:pPr/>
-              <a:t>4/19/16</a:t>
+              <a:t>4/30/16</a:t>
             </a:fld>
             <a:endParaRPr lang="en-US" dirty="0"/>
           </a:p>
@@ -5994,6 +6000,498 @@
           <a:p>
             <a:r>
               <a:rPr lang="en-US" dirty="0" smtClean="0"/>
+              <a:t>Application overview</a:t>
+            </a:r>
+            <a:endParaRPr lang="en-US" dirty="0"/>
+          </a:p>
+        </p:txBody>
+      </p:sp>
+      <p:pic>
+        <p:nvPicPr>
+          <p:cNvPr id="4" name="Content Placeholder 3"/>
+          <p:cNvPicPr>
+            <a:picLocks noGrp="1" noChangeAspect="1"/>
+          </p:cNvPicPr>
+          <p:nvPr>
+            <p:ph idx="1"/>
+          </p:nvPr>
+        </p:nvPicPr>
+        <p:blipFill>
+          <a:blip r:embed="rId2">
+            <a:extLst>
+              <a:ext uri="{28A0092B-C50C-407E-A947-70E740481C1C}">
+                <a14:useLocalDpi xmlns:a14="http://schemas.microsoft.com/office/drawing/2010/main" val="0"/>
+              </a:ext>
+            </a:extLst>
+          </a:blip>
+          <a:stretch>
+            <a:fillRect/>
+          </a:stretch>
+        </p:blipFill>
+        <p:spPr>
+          <a:xfrm>
+            <a:off x="1242219" y="2228056"/>
+            <a:ext cx="7467600" cy="3746500"/>
+          </a:xfrm>
+        </p:spPr>
+      </p:pic>
+    </p:spTree>
+    <p:extLst>
+      <p:ext uri="{BB962C8B-B14F-4D97-AF65-F5344CB8AC3E}">
+        <p14:creationId xmlns:p14="http://schemas.microsoft.com/office/powerpoint/2010/main" val="1310604834"/>
+      </p:ext>
+    </p:extLst>
+  </p:cSld>
+  <p:clrMapOvr>
+    <a:masterClrMapping/>
+  </p:clrMapOvr>
+</p:sld>
+</file>
+
+<file path=ppt/slides/slide12.xml><?xml version="1.0" encoding="utf-8"?>
+<p:sld xmlns:a="http://schemas.openxmlformats.org/drawingml/2006/main" xmlns:r="http://schemas.openxmlformats.org/officeDocument/2006/relationships" xmlns:p="http://schemas.openxmlformats.org/presentationml/2006/main">
+  <p:cSld>
+    <p:spTree>
+      <p:nvGrpSpPr>
+        <p:cNvPr id="1" name=""/>
+        <p:cNvGrpSpPr/>
+        <p:nvPr/>
+      </p:nvGrpSpPr>
+      <p:grpSpPr>
+        <a:xfrm>
+          <a:off x="0" y="0"/>
+          <a:ext cx="0" cy="0"/>
+          <a:chOff x="0" y="0"/>
+          <a:chExt cx="0" cy="0"/>
+        </a:xfrm>
+      </p:grpSpPr>
+      <p:sp>
+        <p:nvSpPr>
+          <p:cNvPr id="2" name="Title 1"/>
+          <p:cNvSpPr>
+            <a:spLocks noGrp="1"/>
+          </p:cNvSpPr>
+          <p:nvPr>
+            <p:ph type="title"/>
+          </p:nvPr>
+        </p:nvSpPr>
+        <p:spPr/>
+        <p:txBody>
+          <a:bodyPr/>
+          <a:lstStyle/>
+          <a:p>
+            <a:r>
+              <a:rPr lang="en-US" dirty="0" smtClean="0"/>
+              <a:t>Use Case -1 (Add a Movie)</a:t>
+            </a:r>
+            <a:endParaRPr lang="en-US" dirty="0"/>
+          </a:p>
+        </p:txBody>
+      </p:sp>
+      <p:pic>
+        <p:nvPicPr>
+          <p:cNvPr id="4" name="Content Placeholder 3"/>
+          <p:cNvPicPr>
+            <a:picLocks noGrp="1" noChangeAspect="1"/>
+          </p:cNvPicPr>
+          <p:nvPr>
+            <p:ph idx="1"/>
+          </p:nvPr>
+        </p:nvPicPr>
+        <p:blipFill>
+          <a:blip r:embed="rId2">
+            <a:extLst>
+              <a:ext uri="{28A0092B-C50C-407E-A947-70E740481C1C}">
+                <a14:useLocalDpi xmlns:a14="http://schemas.microsoft.com/office/drawing/2010/main" val="0"/>
+              </a:ext>
+            </a:extLst>
+          </a:blip>
+          <a:stretch>
+            <a:fillRect/>
+          </a:stretch>
+        </p:blipFill>
+        <p:spPr>
+          <a:xfrm>
+            <a:off x="2064941" y="2160588"/>
+            <a:ext cx="5822155" cy="3881437"/>
+          </a:xfrm>
+        </p:spPr>
+      </p:pic>
+    </p:spTree>
+    <p:extLst>
+      <p:ext uri="{BB962C8B-B14F-4D97-AF65-F5344CB8AC3E}">
+        <p14:creationId xmlns:p14="http://schemas.microsoft.com/office/powerpoint/2010/main" val="301400422"/>
+      </p:ext>
+    </p:extLst>
+  </p:cSld>
+  <p:clrMapOvr>
+    <a:masterClrMapping/>
+  </p:clrMapOvr>
+</p:sld>
+</file>
+
+<file path=ppt/slides/slide13.xml><?xml version="1.0" encoding="utf-8"?>
+<p:sld xmlns:a="http://schemas.openxmlformats.org/drawingml/2006/main" xmlns:r="http://schemas.openxmlformats.org/officeDocument/2006/relationships" xmlns:p="http://schemas.openxmlformats.org/presentationml/2006/main">
+  <p:cSld>
+    <p:spTree>
+      <p:nvGrpSpPr>
+        <p:cNvPr id="1" name=""/>
+        <p:cNvGrpSpPr/>
+        <p:nvPr/>
+      </p:nvGrpSpPr>
+      <p:grpSpPr>
+        <a:xfrm>
+          <a:off x="0" y="0"/>
+          <a:ext cx="0" cy="0"/>
+          <a:chOff x="0" y="0"/>
+          <a:chExt cx="0" cy="0"/>
+        </a:xfrm>
+      </p:grpSpPr>
+      <p:sp>
+        <p:nvSpPr>
+          <p:cNvPr id="2" name="Title 1"/>
+          <p:cNvSpPr>
+            <a:spLocks noGrp="1"/>
+          </p:cNvSpPr>
+          <p:nvPr>
+            <p:ph type="title"/>
+          </p:nvPr>
+        </p:nvSpPr>
+        <p:spPr/>
+        <p:txBody>
+          <a:bodyPr/>
+          <a:lstStyle/>
+          <a:p>
+            <a:r>
+              <a:rPr lang="en-US" dirty="0" smtClean="0"/>
+              <a:t>Use Case -2 (List all Movies)</a:t>
+            </a:r>
+            <a:endParaRPr lang="en-US" dirty="0"/>
+          </a:p>
+        </p:txBody>
+      </p:sp>
+      <p:pic>
+        <p:nvPicPr>
+          <p:cNvPr id="4" name="Content Placeholder 3"/>
+          <p:cNvPicPr>
+            <a:picLocks noGrp="1" noChangeAspect="1"/>
+          </p:cNvPicPr>
+          <p:nvPr>
+            <p:ph idx="1"/>
+          </p:nvPr>
+        </p:nvPicPr>
+        <p:blipFill>
+          <a:blip r:embed="rId2">
+            <a:extLst>
+              <a:ext uri="{28A0092B-C50C-407E-A947-70E740481C1C}">
+                <a14:useLocalDpi xmlns:a14="http://schemas.microsoft.com/office/drawing/2010/main" val="0"/>
+              </a:ext>
+            </a:extLst>
+          </a:blip>
+          <a:stretch>
+            <a:fillRect/>
+          </a:stretch>
+        </p:blipFill>
+        <p:spPr>
+          <a:xfrm>
+            <a:off x="2108651" y="2160588"/>
+            <a:ext cx="5734735" cy="3881437"/>
+          </a:xfrm>
+        </p:spPr>
+      </p:pic>
+    </p:spTree>
+    <p:extLst>
+      <p:ext uri="{BB962C8B-B14F-4D97-AF65-F5344CB8AC3E}">
+        <p14:creationId xmlns:p14="http://schemas.microsoft.com/office/powerpoint/2010/main" val="2093858792"/>
+      </p:ext>
+    </p:extLst>
+  </p:cSld>
+  <p:clrMapOvr>
+    <a:masterClrMapping/>
+  </p:clrMapOvr>
+</p:sld>
+</file>
+
+<file path=ppt/slides/slide14.xml><?xml version="1.0" encoding="utf-8"?>
+<p:sld xmlns:a="http://schemas.openxmlformats.org/drawingml/2006/main" xmlns:r="http://schemas.openxmlformats.org/officeDocument/2006/relationships" xmlns:p="http://schemas.openxmlformats.org/presentationml/2006/main">
+  <p:cSld>
+    <p:spTree>
+      <p:nvGrpSpPr>
+        <p:cNvPr id="1" name=""/>
+        <p:cNvGrpSpPr/>
+        <p:nvPr/>
+      </p:nvGrpSpPr>
+      <p:grpSpPr>
+        <a:xfrm>
+          <a:off x="0" y="0"/>
+          <a:ext cx="0" cy="0"/>
+          <a:chOff x="0" y="0"/>
+          <a:chExt cx="0" cy="0"/>
+        </a:xfrm>
+      </p:grpSpPr>
+      <p:sp>
+        <p:nvSpPr>
+          <p:cNvPr id="2" name="Title 1"/>
+          <p:cNvSpPr>
+            <a:spLocks noGrp="1"/>
+          </p:cNvSpPr>
+          <p:nvPr>
+            <p:ph type="title"/>
+          </p:nvPr>
+        </p:nvSpPr>
+        <p:spPr/>
+        <p:txBody>
+          <a:bodyPr/>
+          <a:lstStyle/>
+          <a:p>
+            <a:r>
+              <a:rPr lang="en-US" dirty="0" smtClean="0"/>
+              <a:t>Use Case – 3 (Book a Ticket)</a:t>
+            </a:r>
+            <a:endParaRPr lang="en-US" dirty="0"/>
+          </a:p>
+        </p:txBody>
+      </p:sp>
+      <p:pic>
+        <p:nvPicPr>
+          <p:cNvPr id="4" name="Content Placeholder 3"/>
+          <p:cNvPicPr>
+            <a:picLocks noGrp="1" noChangeAspect="1"/>
+          </p:cNvPicPr>
+          <p:nvPr>
+            <p:ph idx="1"/>
+          </p:nvPr>
+        </p:nvPicPr>
+        <p:blipFill>
+          <a:blip r:embed="rId2">
+            <a:extLst>
+              <a:ext uri="{28A0092B-C50C-407E-A947-70E740481C1C}">
+                <a14:useLocalDpi xmlns:a14="http://schemas.microsoft.com/office/drawing/2010/main" val="0"/>
+              </a:ext>
+            </a:extLst>
+          </a:blip>
+          <a:stretch>
+            <a:fillRect/>
+          </a:stretch>
+        </p:blipFill>
+        <p:spPr>
+          <a:xfrm>
+            <a:off x="1956563" y="2160588"/>
+            <a:ext cx="6038911" cy="3881437"/>
+          </a:xfrm>
+        </p:spPr>
+      </p:pic>
+    </p:spTree>
+    <p:extLst>
+      <p:ext uri="{BB962C8B-B14F-4D97-AF65-F5344CB8AC3E}">
+        <p14:creationId xmlns:p14="http://schemas.microsoft.com/office/powerpoint/2010/main" val="394711770"/>
+      </p:ext>
+    </p:extLst>
+  </p:cSld>
+  <p:clrMapOvr>
+    <a:masterClrMapping/>
+  </p:clrMapOvr>
+</p:sld>
+</file>
+
+<file path=ppt/slides/slide15.xml><?xml version="1.0" encoding="utf-8"?>
+<p:sld xmlns:a="http://schemas.openxmlformats.org/drawingml/2006/main" xmlns:r="http://schemas.openxmlformats.org/officeDocument/2006/relationships" xmlns:p="http://schemas.openxmlformats.org/presentationml/2006/main">
+  <p:cSld>
+    <p:spTree>
+      <p:nvGrpSpPr>
+        <p:cNvPr id="1" name=""/>
+        <p:cNvGrpSpPr/>
+        <p:nvPr/>
+      </p:nvGrpSpPr>
+      <p:grpSpPr>
+        <a:xfrm>
+          <a:off x="0" y="0"/>
+          <a:ext cx="0" cy="0"/>
+          <a:chOff x="0" y="0"/>
+          <a:chExt cx="0" cy="0"/>
+        </a:xfrm>
+      </p:grpSpPr>
+      <p:sp>
+        <p:nvSpPr>
+          <p:cNvPr id="2" name="Title 1"/>
+          <p:cNvSpPr>
+            <a:spLocks noGrp="1"/>
+          </p:cNvSpPr>
+          <p:nvPr>
+            <p:ph type="title"/>
+          </p:nvPr>
+        </p:nvSpPr>
+        <p:spPr/>
+        <p:txBody>
+          <a:bodyPr/>
+          <a:lstStyle/>
+          <a:p>
+            <a:r>
+              <a:rPr lang="en-US" dirty="0" smtClean="0"/>
+              <a:t>Use Case – 4 (List all Tickets)</a:t>
+            </a:r>
+            <a:endParaRPr lang="en-US" dirty="0"/>
+          </a:p>
+        </p:txBody>
+      </p:sp>
+      <p:pic>
+        <p:nvPicPr>
+          <p:cNvPr id="4" name="Content Placeholder 3"/>
+          <p:cNvPicPr>
+            <a:picLocks noGrp="1" noChangeAspect="1"/>
+          </p:cNvPicPr>
+          <p:nvPr>
+            <p:ph idx="1"/>
+          </p:nvPr>
+        </p:nvPicPr>
+        <p:blipFill>
+          <a:blip r:embed="rId2">
+            <a:extLst>
+              <a:ext uri="{28A0092B-C50C-407E-A947-70E740481C1C}">
+                <a14:useLocalDpi xmlns:a14="http://schemas.microsoft.com/office/drawing/2010/main" val="0"/>
+              </a:ext>
+            </a:extLst>
+          </a:blip>
+          <a:stretch>
+            <a:fillRect/>
+          </a:stretch>
+        </p:blipFill>
+        <p:spPr>
+          <a:xfrm>
+            <a:off x="1289874" y="2160588"/>
+            <a:ext cx="7372289" cy="3881437"/>
+          </a:xfrm>
+        </p:spPr>
+      </p:pic>
+    </p:spTree>
+    <p:extLst>
+      <p:ext uri="{BB962C8B-B14F-4D97-AF65-F5344CB8AC3E}">
+        <p14:creationId xmlns:p14="http://schemas.microsoft.com/office/powerpoint/2010/main" val="386276819"/>
+      </p:ext>
+    </p:extLst>
+  </p:cSld>
+  <p:clrMapOvr>
+    <a:masterClrMapping/>
+  </p:clrMapOvr>
+</p:sld>
+</file>
+
+<file path=ppt/slides/slide16.xml><?xml version="1.0" encoding="utf-8"?>
+<p:sld xmlns:a="http://schemas.openxmlformats.org/drawingml/2006/main" xmlns:r="http://schemas.openxmlformats.org/officeDocument/2006/relationships" xmlns:p="http://schemas.openxmlformats.org/presentationml/2006/main">
+  <p:cSld>
+    <p:spTree>
+      <p:nvGrpSpPr>
+        <p:cNvPr id="1" name=""/>
+        <p:cNvGrpSpPr/>
+        <p:nvPr/>
+      </p:nvGrpSpPr>
+      <p:grpSpPr>
+        <a:xfrm>
+          <a:off x="0" y="0"/>
+          <a:ext cx="0" cy="0"/>
+          <a:chOff x="0" y="0"/>
+          <a:chExt cx="0" cy="0"/>
+        </a:xfrm>
+      </p:grpSpPr>
+      <p:sp>
+        <p:nvSpPr>
+          <p:cNvPr id="2" name="Title 1"/>
+          <p:cNvSpPr>
+            <a:spLocks noGrp="1"/>
+          </p:cNvSpPr>
+          <p:nvPr>
+            <p:ph type="title"/>
+          </p:nvPr>
+        </p:nvSpPr>
+        <p:spPr/>
+        <p:txBody>
+          <a:bodyPr/>
+          <a:lstStyle/>
+          <a:p>
+            <a:r>
+              <a:rPr lang="en-US" dirty="0" smtClean="0"/>
+              <a:t>Use Case – 5 (Find the reservation)</a:t>
+            </a:r>
+            <a:endParaRPr lang="en-US" dirty="0"/>
+          </a:p>
+        </p:txBody>
+      </p:sp>
+      <p:pic>
+        <p:nvPicPr>
+          <p:cNvPr id="4" name="Content Placeholder 3"/>
+          <p:cNvPicPr>
+            <a:picLocks noGrp="1" noChangeAspect="1"/>
+          </p:cNvPicPr>
+          <p:nvPr>
+            <p:ph idx="1"/>
+          </p:nvPr>
+        </p:nvPicPr>
+        <p:blipFill>
+          <a:blip r:embed="rId2">
+            <a:extLst>
+              <a:ext uri="{28A0092B-C50C-407E-A947-70E740481C1C}">
+                <a14:useLocalDpi xmlns:a14="http://schemas.microsoft.com/office/drawing/2010/main" val="0"/>
+              </a:ext>
+            </a:extLst>
+          </a:blip>
+          <a:stretch>
+            <a:fillRect/>
+          </a:stretch>
+        </p:blipFill>
+        <p:spPr>
+          <a:xfrm>
+            <a:off x="1719040" y="2160588"/>
+            <a:ext cx="6513957" cy="3881437"/>
+          </a:xfrm>
+        </p:spPr>
+      </p:pic>
+    </p:spTree>
+    <p:extLst>
+      <p:ext uri="{BB962C8B-B14F-4D97-AF65-F5344CB8AC3E}">
+        <p14:creationId xmlns:p14="http://schemas.microsoft.com/office/powerpoint/2010/main" val="886197792"/>
+      </p:ext>
+    </p:extLst>
+  </p:cSld>
+  <p:clrMapOvr>
+    <a:masterClrMapping/>
+  </p:clrMapOvr>
+</p:sld>
+</file>
+
+<file path=ppt/slides/slide17.xml><?xml version="1.0" encoding="utf-8"?>
+<p:sld xmlns:a="http://schemas.openxmlformats.org/drawingml/2006/main" xmlns:r="http://schemas.openxmlformats.org/officeDocument/2006/relationships" xmlns:p="http://schemas.openxmlformats.org/presentationml/2006/main">
+  <p:cSld>
+    <p:spTree>
+      <p:nvGrpSpPr>
+        <p:cNvPr id="1" name=""/>
+        <p:cNvGrpSpPr/>
+        <p:nvPr/>
+      </p:nvGrpSpPr>
+      <p:grpSpPr>
+        <a:xfrm>
+          <a:off x="0" y="0"/>
+          <a:ext cx="0" cy="0"/>
+          <a:chOff x="0" y="0"/>
+          <a:chExt cx="0" cy="0"/>
+        </a:xfrm>
+      </p:grpSpPr>
+      <p:sp>
+        <p:nvSpPr>
+          <p:cNvPr id="2" name="Title 1"/>
+          <p:cNvSpPr>
+            <a:spLocks noGrp="1"/>
+          </p:cNvSpPr>
+          <p:nvPr>
+            <p:ph type="title"/>
+          </p:nvPr>
+        </p:nvSpPr>
+        <p:spPr/>
+        <p:txBody>
+          <a:bodyPr/>
+          <a:lstStyle/>
+          <a:p>
+            <a:r>
+              <a:rPr lang="en-US" dirty="0" smtClean="0"/>
               <a:t>Results</a:t>
             </a:r>
             <a:endParaRPr lang="en-US" dirty="0"/>
@@ -6066,7 +6564,7 @@
 </p:sld>
 </file>
 
-<file path=ppt/slides/slide12.xml><?xml version="1.0" encoding="utf-8"?>
+<file path=ppt/slides/slide18.xml><?xml version="1.0" encoding="utf-8"?>
 <p:sld xmlns:a="http://schemas.openxmlformats.org/drawingml/2006/main" xmlns:r="http://schemas.openxmlformats.org/officeDocument/2006/relationships" xmlns:p="http://schemas.openxmlformats.org/presentationml/2006/main">
   <p:cSld>
     <p:spTree>
@@ -6148,7 +6646,7 @@
 </p:sld>
 </file>
 
-<file path=ppt/slides/slide13.xml><?xml version="1.0" encoding="utf-8"?>
+<file path=ppt/slides/slide19.xml><?xml version="1.0" encoding="utf-8"?>
 <p:sld xmlns:a="http://schemas.openxmlformats.org/drawingml/2006/main" xmlns:r="http://schemas.openxmlformats.org/officeDocument/2006/relationships" xmlns:p="http://schemas.openxmlformats.org/presentationml/2006/main">
   <p:cSld>
     <p:spTree>

</xml_diff>